<commit_message>
changes made during classes
</commit_message>
<xml_diff>
--- a/presentations/source/00-intro.pptx
+++ b/presentations/source/00-intro.pptx
@@ -210,7 +210,7 @@
             <a:fld id="{7307762F-A706-E543-A832-3C298AA3103F}" type="datetimeFigureOut">
               <a:rPr lang="en-US" smtClean="0"/>
               <a:pPr/>
-              <a:t>11/21/14</a:t>
+              <a:t>12/1/14</a:t>
             </a:fld>
             <a:endParaRPr lang="en-US" dirty="0"/>
           </a:p>
@@ -777,7 +777,7 @@
           <a:p>
             <a:fld id="{875CF0EB-321F-0749-B37A-89BBA859503C}" type="datetimeFigureOut">
               <a:rPr lang="en-US" smtClean="0"/>
-              <a:t>11/21/14</a:t>
+              <a:t>12/1/14</a:t>
             </a:fld>
             <a:endParaRPr lang="en-US"/>
           </a:p>
@@ -981,7 +981,7 @@
           <a:p>
             <a:fld id="{875CF0EB-321F-0749-B37A-89BBA859503C}" type="datetimeFigureOut">
               <a:rPr lang="en-US" smtClean="0"/>
-              <a:t>11/21/14</a:t>
+              <a:t>12/1/14</a:t>
             </a:fld>
             <a:endParaRPr lang="en-US"/>
           </a:p>
@@ -1175,7 +1175,7 @@
           <a:p>
             <a:fld id="{875CF0EB-321F-0749-B37A-89BBA859503C}" type="datetimeFigureOut">
               <a:rPr lang="en-US" smtClean="0"/>
-              <a:t>11/21/14</a:t>
+              <a:t>12/1/14</a:t>
             </a:fld>
             <a:endParaRPr lang="en-US"/>
           </a:p>
@@ -1445,7 +1445,7 @@
           <a:p>
             <a:fld id="{875CF0EB-321F-0749-B37A-89BBA859503C}" type="datetimeFigureOut">
               <a:rPr lang="en-US" smtClean="0"/>
-              <a:t>11/21/14</a:t>
+              <a:t>12/1/14</a:t>
             </a:fld>
             <a:endParaRPr lang="en-US"/>
           </a:p>
@@ -1757,7 +1757,7 @@
           <a:p>
             <a:fld id="{875CF0EB-321F-0749-B37A-89BBA859503C}" type="datetimeFigureOut">
               <a:rPr lang="en-US" smtClean="0"/>
-              <a:t>11/21/14</a:t>
+              <a:t>12/1/14</a:t>
             </a:fld>
             <a:endParaRPr lang="en-US"/>
           </a:p>
@@ -2203,7 +2203,7 @@
           <a:p>
             <a:fld id="{875CF0EB-321F-0749-B37A-89BBA859503C}" type="datetimeFigureOut">
               <a:rPr lang="en-US" smtClean="0"/>
-              <a:t>11/21/14</a:t>
+              <a:t>12/1/14</a:t>
             </a:fld>
             <a:endParaRPr lang="en-US"/>
           </a:p>
@@ -2345,7 +2345,7 @@
           <a:p>
             <a:fld id="{875CF0EB-321F-0749-B37A-89BBA859503C}" type="datetimeFigureOut">
               <a:rPr lang="en-US" smtClean="0"/>
-              <a:t>11/21/14</a:t>
+              <a:t>12/1/14</a:t>
             </a:fld>
             <a:endParaRPr lang="en-US"/>
           </a:p>
@@ -2464,7 +2464,7 @@
           <a:p>
             <a:fld id="{875CF0EB-321F-0749-B37A-89BBA859503C}" type="datetimeFigureOut">
               <a:rPr lang="en-US" smtClean="0"/>
-              <a:t>11/21/14</a:t>
+              <a:t>12/1/14</a:t>
             </a:fld>
             <a:endParaRPr lang="en-US"/>
           </a:p>
@@ -2765,7 +2765,7 @@
           <a:p>
             <a:fld id="{875CF0EB-321F-0749-B37A-89BBA859503C}" type="datetimeFigureOut">
               <a:rPr lang="en-US" smtClean="0"/>
-              <a:t>11/21/14</a:t>
+              <a:t>12/1/14</a:t>
             </a:fld>
             <a:endParaRPr lang="en-US"/>
           </a:p>
@@ -3042,7 +3042,7 @@
           <a:p>
             <a:fld id="{875CF0EB-321F-0749-B37A-89BBA859503C}" type="datetimeFigureOut">
               <a:rPr lang="en-US" smtClean="0"/>
-              <a:t>11/21/14</a:t>
+              <a:t>12/1/14</a:t>
             </a:fld>
             <a:endParaRPr lang="en-US"/>
           </a:p>
@@ -5874,26 +5874,40 @@
               <a:defRPr/>
             </a:pPr>
             <a:r>
-              <a:rPr lang="en-US" sz="2400" b="1" dirty="0"/>
+              <a:rPr lang="en-US" sz="2400" b="1" dirty="0" smtClean="0"/>
               <a:t>Java</a:t>
             </a:r>
-            <a:endParaRPr lang="en-US" sz="2400" dirty="0"/>
-          </a:p>
-          <a:p>
-            <a:pPr marL="178587" indent="0">
-              <a:buNone/>
+          </a:p>
+          <a:p>
+            <a:pPr lvl="1">
               <a:defRPr/>
             </a:pPr>
             <a:r>
-              <a:rPr lang="en-US" sz="2400" dirty="0"/>
-              <a:t>	Basic Java language skills</a:t>
-            </a:r>
-          </a:p>
-          <a:p>
-            <a:pPr marL="178587" indent="0">
-              <a:buNone/>
+              <a:rPr lang="en-US" sz="2000" dirty="0"/>
+              <a:t>	Basic Java language </a:t>
+            </a:r>
+            <a:r>
+              <a:rPr lang="en-US" sz="2000" dirty="0" smtClean="0"/>
+              <a:t>skills</a:t>
+            </a:r>
+            <a:endParaRPr lang="en-US" sz="2000" b="1" dirty="0" smtClean="0"/>
+          </a:p>
+          <a:p>
+            <a:pPr>
               <a:defRPr/>
             </a:pPr>
+            <a:r>
+              <a:rPr lang="en-US" sz="2400" dirty="0"/>
+              <a:t>Unix </a:t>
+            </a:r>
+            <a:r>
+              <a:rPr lang="en-US" sz="2400"/>
+              <a:t>Command </a:t>
+            </a:r>
+            <a:r>
+              <a:rPr lang="en-US" sz="2400" smtClean="0"/>
+              <a:t>Line</a:t>
+            </a:r>
             <a:endParaRPr lang="en-US" sz="2400" dirty="0"/>
           </a:p>
           <a:p>

</xml_diff>